<commit_message>
commit before removing RxRiskV
</commit_message>
<xml_diff>
--- a/graphs/fig1.pptx
+++ b/graphs/fig1.pptx
@@ -2,12 +2,12 @@
 <file path=ppt/presentation.xml><?xml version="1.0" encoding="utf-8"?>
 <p:presentation xmlns:a="http://schemas.openxmlformats.org/drawingml/2006/main" xmlns:r="http://schemas.openxmlformats.org/officeDocument/2006/relationships" xmlns:p="http://schemas.openxmlformats.org/presentationml/2006/main" saveSubsetFonts="1">
   <p:sldMasterIdLst>
-    <p:sldMasterId id="2147483720" r:id="rId1"/>
+    <p:sldMasterId id="2147483732" r:id="rId1"/>
   </p:sldMasterIdLst>
   <p:sldIdLst>
     <p:sldId id="256" r:id="rId2"/>
   </p:sldIdLst>
-  <p:sldSz cx="6858000" cy="7920038"/>
+  <p:sldSz cx="6858000" cy="7199313"/>
   <p:notesSz cx="6858000" cy="9144000"/>
   <p:defaultTextStyle>
     <a:defPPr>
@@ -107,7 +107,7 @@
   <p:extLst>
     <p:ext uri="{EFAFB233-063F-42B5-8137-9DF3F51BA10A}">
       <p15:sldGuideLst xmlns:p15="http://schemas.microsoft.com/office/powerpoint/2012/main">
-        <p15:guide id="1" orient="horz" pos="2495" userDrawn="1">
+        <p15:guide id="1" orient="horz" pos="2268" userDrawn="1">
           <p15:clr>
             <a:srgbClr val="A4A3A4"/>
           </p15:clr>
@@ -152,8 +152,8 @@
         </p:nvSpPr>
         <p:spPr>
           <a:xfrm>
-            <a:off x="514350" y="1296173"/>
-            <a:ext cx="5829300" cy="2757347"/>
+            <a:off x="514350" y="1178222"/>
+            <a:ext cx="5829300" cy="2506427"/>
           </a:xfrm>
         </p:spPr>
         <p:txBody>
@@ -184,8 +184,8 @@
         </p:nvSpPr>
         <p:spPr>
           <a:xfrm>
-            <a:off x="857250" y="4159854"/>
-            <a:ext cx="5143500" cy="1912175"/>
+            <a:off x="857250" y="3781306"/>
+            <a:ext cx="5143500" cy="1738167"/>
           </a:xfrm>
         </p:spPr>
         <p:txBody>
@@ -254,7 +254,7 @@
           <a:p>
             <a:fld id="{25CFA59A-171D-4C41-9418-ADAB2FBD5A82}" type="datetimeFigureOut">
               <a:rPr lang="en-US" smtClean="0"/>
-              <a:t>3/12/2019</a:t>
+              <a:t>5/22/2019</a:t>
             </a:fld>
             <a:endParaRPr lang="en-US"/>
           </a:p>
@@ -305,7 +305,7 @@
     </p:spTree>
     <p:extLst>
       <p:ext uri="{BB962C8B-B14F-4D97-AF65-F5344CB8AC3E}">
-        <p14:creationId xmlns:p14="http://schemas.microsoft.com/office/powerpoint/2010/main" val="2039146811"/>
+        <p14:creationId xmlns:p14="http://schemas.microsoft.com/office/powerpoint/2010/main" val="2307928444"/>
       </p:ext>
     </p:extLst>
   </p:cSld>
@@ -424,7 +424,7 @@
           <a:p>
             <a:fld id="{25CFA59A-171D-4C41-9418-ADAB2FBD5A82}" type="datetimeFigureOut">
               <a:rPr lang="en-US" smtClean="0"/>
-              <a:t>3/12/2019</a:t>
+              <a:t>5/22/2019</a:t>
             </a:fld>
             <a:endParaRPr lang="en-US"/>
           </a:p>
@@ -475,7 +475,7 @@
     </p:spTree>
     <p:extLst>
       <p:ext uri="{BB962C8B-B14F-4D97-AF65-F5344CB8AC3E}">
-        <p14:creationId xmlns:p14="http://schemas.microsoft.com/office/powerpoint/2010/main" val="3481227694"/>
+        <p14:creationId xmlns:p14="http://schemas.microsoft.com/office/powerpoint/2010/main" val="2339092116"/>
       </p:ext>
     </p:extLst>
   </p:cSld>
@@ -514,8 +514,8 @@
         </p:nvSpPr>
         <p:spPr>
           <a:xfrm>
-            <a:off x="4907757" y="421669"/>
-            <a:ext cx="1478756" cy="6711866"/>
+            <a:off x="4907757" y="383297"/>
+            <a:ext cx="1478756" cy="6101085"/>
           </a:xfrm>
         </p:spPr>
         <p:txBody>
@@ -542,8 +542,8 @@
         </p:nvSpPr>
         <p:spPr>
           <a:xfrm>
-            <a:off x="471488" y="421669"/>
-            <a:ext cx="4350544" cy="6711866"/>
+            <a:off x="471488" y="383297"/>
+            <a:ext cx="4350544" cy="6101085"/>
           </a:xfrm>
         </p:spPr>
         <p:txBody>
@@ -604,7 +604,7 @@
           <a:p>
             <a:fld id="{25CFA59A-171D-4C41-9418-ADAB2FBD5A82}" type="datetimeFigureOut">
               <a:rPr lang="en-US" smtClean="0"/>
-              <a:t>3/12/2019</a:t>
+              <a:t>5/22/2019</a:t>
             </a:fld>
             <a:endParaRPr lang="en-US"/>
           </a:p>
@@ -655,7 +655,7 @@
     </p:spTree>
     <p:extLst>
       <p:ext uri="{BB962C8B-B14F-4D97-AF65-F5344CB8AC3E}">
-        <p14:creationId xmlns:p14="http://schemas.microsoft.com/office/powerpoint/2010/main" val="3220721679"/>
+        <p14:creationId xmlns:p14="http://schemas.microsoft.com/office/powerpoint/2010/main" val="731396657"/>
       </p:ext>
     </p:extLst>
   </p:cSld>
@@ -774,7 +774,7 @@
           <a:p>
             <a:fld id="{25CFA59A-171D-4C41-9418-ADAB2FBD5A82}" type="datetimeFigureOut">
               <a:rPr lang="en-US" smtClean="0"/>
-              <a:t>3/12/2019</a:t>
+              <a:t>5/22/2019</a:t>
             </a:fld>
             <a:endParaRPr lang="en-US"/>
           </a:p>
@@ -825,7 +825,7 @@
     </p:spTree>
     <p:extLst>
       <p:ext uri="{BB962C8B-B14F-4D97-AF65-F5344CB8AC3E}">
-        <p14:creationId xmlns:p14="http://schemas.microsoft.com/office/powerpoint/2010/main" val="2144108769"/>
+        <p14:creationId xmlns:p14="http://schemas.microsoft.com/office/powerpoint/2010/main" val="670644357"/>
       </p:ext>
     </p:extLst>
   </p:cSld>
@@ -864,8 +864,8 @@
         </p:nvSpPr>
         <p:spPr>
           <a:xfrm>
-            <a:off x="467916" y="1974512"/>
-            <a:ext cx="5915025" cy="3294515"/>
+            <a:off x="467916" y="1794831"/>
+            <a:ext cx="5915025" cy="2994714"/>
           </a:xfrm>
         </p:spPr>
         <p:txBody>
@@ -896,8 +896,8 @@
         </p:nvSpPr>
         <p:spPr>
           <a:xfrm>
-            <a:off x="467916" y="5300194"/>
-            <a:ext cx="5915025" cy="1732508"/>
+            <a:off x="467916" y="4817876"/>
+            <a:ext cx="5915025" cy="1574849"/>
           </a:xfrm>
         </p:spPr>
         <p:txBody>
@@ -1018,7 +1018,7 @@
           <a:p>
             <a:fld id="{25CFA59A-171D-4C41-9418-ADAB2FBD5A82}" type="datetimeFigureOut">
               <a:rPr lang="en-US" smtClean="0"/>
-              <a:t>3/12/2019</a:t>
+              <a:t>5/22/2019</a:t>
             </a:fld>
             <a:endParaRPr lang="en-US"/>
           </a:p>
@@ -1069,7 +1069,7 @@
     </p:spTree>
     <p:extLst>
       <p:ext uri="{BB962C8B-B14F-4D97-AF65-F5344CB8AC3E}">
-        <p14:creationId xmlns:p14="http://schemas.microsoft.com/office/powerpoint/2010/main" val="3380737500"/>
+        <p14:creationId xmlns:p14="http://schemas.microsoft.com/office/powerpoint/2010/main" val="2072259937"/>
       </p:ext>
     </p:extLst>
   </p:cSld>
@@ -1131,8 +1131,8 @@
         </p:nvSpPr>
         <p:spPr>
           <a:xfrm>
-            <a:off x="471488" y="2108344"/>
-            <a:ext cx="2914650" cy="5025191"/>
+            <a:off x="471488" y="1916484"/>
+            <a:ext cx="2914650" cy="4567898"/>
           </a:xfrm>
         </p:spPr>
         <p:txBody>
@@ -1188,8 +1188,8 @@
         </p:nvSpPr>
         <p:spPr>
           <a:xfrm>
-            <a:off x="3471863" y="2108344"/>
-            <a:ext cx="2914650" cy="5025191"/>
+            <a:off x="3471863" y="1916484"/>
+            <a:ext cx="2914650" cy="4567898"/>
           </a:xfrm>
         </p:spPr>
         <p:txBody>
@@ -1250,7 +1250,7 @@
           <a:p>
             <a:fld id="{25CFA59A-171D-4C41-9418-ADAB2FBD5A82}" type="datetimeFigureOut">
               <a:rPr lang="en-US" smtClean="0"/>
-              <a:t>3/12/2019</a:t>
+              <a:t>5/22/2019</a:t>
             </a:fld>
             <a:endParaRPr lang="en-US"/>
           </a:p>
@@ -1301,7 +1301,7 @@
     </p:spTree>
     <p:extLst>
       <p:ext uri="{BB962C8B-B14F-4D97-AF65-F5344CB8AC3E}">
-        <p14:creationId xmlns:p14="http://schemas.microsoft.com/office/powerpoint/2010/main" val="2860855746"/>
+        <p14:creationId xmlns:p14="http://schemas.microsoft.com/office/powerpoint/2010/main" val="1978406642"/>
       </p:ext>
     </p:extLst>
   </p:cSld>
@@ -1340,8 +1340,8 @@
         </p:nvSpPr>
         <p:spPr>
           <a:xfrm>
-            <a:off x="472381" y="421671"/>
-            <a:ext cx="5915025" cy="1530841"/>
+            <a:off x="472381" y="383299"/>
+            <a:ext cx="5915025" cy="1391534"/>
           </a:xfrm>
         </p:spPr>
         <p:txBody>
@@ -1368,8 +1368,8 @@
         </p:nvSpPr>
         <p:spPr>
           <a:xfrm>
-            <a:off x="472381" y="1941510"/>
-            <a:ext cx="2901255" cy="951504"/>
+            <a:off x="472381" y="1764832"/>
+            <a:ext cx="2901255" cy="864917"/>
           </a:xfrm>
         </p:spPr>
         <p:txBody>
@@ -1433,8 +1433,8 @@
         </p:nvSpPr>
         <p:spPr>
           <a:xfrm>
-            <a:off x="472381" y="2893014"/>
-            <a:ext cx="2901255" cy="4255188"/>
+            <a:off x="472381" y="2629749"/>
+            <a:ext cx="2901255" cy="3867965"/>
           </a:xfrm>
         </p:spPr>
         <p:txBody>
@@ -1490,8 +1490,8 @@
         </p:nvSpPr>
         <p:spPr>
           <a:xfrm>
-            <a:off x="3471863" y="1941510"/>
-            <a:ext cx="2915543" cy="951504"/>
+            <a:off x="3471863" y="1764832"/>
+            <a:ext cx="2915543" cy="864917"/>
           </a:xfrm>
         </p:spPr>
         <p:txBody>
@@ -1555,8 +1555,8 @@
         </p:nvSpPr>
         <p:spPr>
           <a:xfrm>
-            <a:off x="3471863" y="2893014"/>
-            <a:ext cx="2915543" cy="4255188"/>
+            <a:off x="3471863" y="2629749"/>
+            <a:ext cx="2915543" cy="3867965"/>
           </a:xfrm>
         </p:spPr>
         <p:txBody>
@@ -1617,7 +1617,7 @@
           <a:p>
             <a:fld id="{25CFA59A-171D-4C41-9418-ADAB2FBD5A82}" type="datetimeFigureOut">
               <a:rPr lang="en-US" smtClean="0"/>
-              <a:t>3/12/2019</a:t>
+              <a:t>5/22/2019</a:t>
             </a:fld>
             <a:endParaRPr lang="en-US"/>
           </a:p>
@@ -1668,7 +1668,7 @@
     </p:spTree>
     <p:extLst>
       <p:ext uri="{BB962C8B-B14F-4D97-AF65-F5344CB8AC3E}">
-        <p14:creationId xmlns:p14="http://schemas.microsoft.com/office/powerpoint/2010/main" val="1828534088"/>
+        <p14:creationId xmlns:p14="http://schemas.microsoft.com/office/powerpoint/2010/main" val="3207093663"/>
       </p:ext>
     </p:extLst>
   </p:cSld>
@@ -1735,7 +1735,7 @@
           <a:p>
             <a:fld id="{25CFA59A-171D-4C41-9418-ADAB2FBD5A82}" type="datetimeFigureOut">
               <a:rPr lang="en-US" smtClean="0"/>
-              <a:t>3/12/2019</a:t>
+              <a:t>5/22/2019</a:t>
             </a:fld>
             <a:endParaRPr lang="en-US"/>
           </a:p>
@@ -1786,7 +1786,7 @@
     </p:spTree>
     <p:extLst>
       <p:ext uri="{BB962C8B-B14F-4D97-AF65-F5344CB8AC3E}">
-        <p14:creationId xmlns:p14="http://schemas.microsoft.com/office/powerpoint/2010/main" val="388573693"/>
+        <p14:creationId xmlns:p14="http://schemas.microsoft.com/office/powerpoint/2010/main" val="3780452060"/>
       </p:ext>
     </p:extLst>
   </p:cSld>
@@ -1830,7 +1830,7 @@
           <a:p>
             <a:fld id="{25CFA59A-171D-4C41-9418-ADAB2FBD5A82}" type="datetimeFigureOut">
               <a:rPr lang="en-US" smtClean="0"/>
-              <a:t>3/12/2019</a:t>
+              <a:t>5/22/2019</a:t>
             </a:fld>
             <a:endParaRPr lang="en-US"/>
           </a:p>
@@ -1881,7 +1881,7 @@
     </p:spTree>
     <p:extLst>
       <p:ext uri="{BB962C8B-B14F-4D97-AF65-F5344CB8AC3E}">
-        <p14:creationId xmlns:p14="http://schemas.microsoft.com/office/powerpoint/2010/main" val="4261347190"/>
+        <p14:creationId xmlns:p14="http://schemas.microsoft.com/office/powerpoint/2010/main" val="3644984795"/>
       </p:ext>
     </p:extLst>
   </p:cSld>
@@ -1920,8 +1920,8 @@
         </p:nvSpPr>
         <p:spPr>
           <a:xfrm>
-            <a:off x="472381" y="528002"/>
-            <a:ext cx="2211884" cy="1848009"/>
+            <a:off x="472381" y="479954"/>
+            <a:ext cx="2211884" cy="1679840"/>
           </a:xfrm>
         </p:spPr>
         <p:txBody>
@@ -1952,8 +1952,8 @@
         </p:nvSpPr>
         <p:spPr>
           <a:xfrm>
-            <a:off x="2915543" y="1140341"/>
-            <a:ext cx="3471863" cy="5628360"/>
+            <a:off x="2915543" y="1036570"/>
+            <a:ext cx="3471863" cy="5116178"/>
           </a:xfrm>
         </p:spPr>
         <p:txBody>
@@ -2037,8 +2037,8 @@
         </p:nvSpPr>
         <p:spPr>
           <a:xfrm>
-            <a:off x="472381" y="2376011"/>
-            <a:ext cx="2211884" cy="4401855"/>
+            <a:off x="472381" y="2159794"/>
+            <a:ext cx="2211884" cy="4001285"/>
           </a:xfrm>
         </p:spPr>
         <p:txBody>
@@ -2107,7 +2107,7 @@
           <a:p>
             <a:fld id="{25CFA59A-171D-4C41-9418-ADAB2FBD5A82}" type="datetimeFigureOut">
               <a:rPr lang="en-US" smtClean="0"/>
-              <a:t>3/12/2019</a:t>
+              <a:t>5/22/2019</a:t>
             </a:fld>
             <a:endParaRPr lang="en-US"/>
           </a:p>
@@ -2158,7 +2158,7 @@
     </p:spTree>
     <p:extLst>
       <p:ext uri="{BB962C8B-B14F-4D97-AF65-F5344CB8AC3E}">
-        <p14:creationId xmlns:p14="http://schemas.microsoft.com/office/powerpoint/2010/main" val="1606090477"/>
+        <p14:creationId xmlns:p14="http://schemas.microsoft.com/office/powerpoint/2010/main" val="4246650170"/>
       </p:ext>
     </p:extLst>
   </p:cSld>
@@ -2197,8 +2197,8 @@
         </p:nvSpPr>
         <p:spPr>
           <a:xfrm>
-            <a:off x="472381" y="528002"/>
-            <a:ext cx="2211884" cy="1848009"/>
+            <a:off x="472381" y="479954"/>
+            <a:ext cx="2211884" cy="1679840"/>
           </a:xfrm>
         </p:spPr>
         <p:txBody>
@@ -2229,8 +2229,8 @@
         </p:nvSpPr>
         <p:spPr>
           <a:xfrm>
-            <a:off x="2915543" y="1140341"/>
-            <a:ext cx="3471863" cy="5628360"/>
+            <a:off x="2915543" y="1036570"/>
+            <a:ext cx="3471863" cy="5116178"/>
           </a:xfrm>
         </p:spPr>
         <p:txBody>
@@ -2294,8 +2294,8 @@
         </p:nvSpPr>
         <p:spPr>
           <a:xfrm>
-            <a:off x="472381" y="2376011"/>
-            <a:ext cx="2211884" cy="4401855"/>
+            <a:off x="472381" y="2159794"/>
+            <a:ext cx="2211884" cy="4001285"/>
           </a:xfrm>
         </p:spPr>
         <p:txBody>
@@ -2364,7 +2364,7 @@
           <a:p>
             <a:fld id="{25CFA59A-171D-4C41-9418-ADAB2FBD5A82}" type="datetimeFigureOut">
               <a:rPr lang="en-US" smtClean="0"/>
-              <a:t>3/12/2019</a:t>
+              <a:t>5/22/2019</a:t>
             </a:fld>
             <a:endParaRPr lang="en-US"/>
           </a:p>
@@ -2415,7 +2415,7 @@
     </p:spTree>
     <p:extLst>
       <p:ext uri="{BB962C8B-B14F-4D97-AF65-F5344CB8AC3E}">
-        <p14:creationId xmlns:p14="http://schemas.microsoft.com/office/powerpoint/2010/main" val="121727850"/>
+        <p14:creationId xmlns:p14="http://schemas.microsoft.com/office/powerpoint/2010/main" val="4288771220"/>
       </p:ext>
     </p:extLst>
   </p:cSld>
@@ -2459,8 +2459,8 @@
         </p:nvSpPr>
         <p:spPr>
           <a:xfrm>
-            <a:off x="471488" y="421671"/>
-            <a:ext cx="5915025" cy="1530841"/>
+            <a:off x="471488" y="383299"/>
+            <a:ext cx="5915025" cy="1391534"/>
           </a:xfrm>
           <a:prstGeom prst="rect">
             <a:avLst/>
@@ -2492,8 +2492,8 @@
         </p:nvSpPr>
         <p:spPr>
           <a:xfrm>
-            <a:off x="471488" y="2108344"/>
-            <a:ext cx="5915025" cy="5025191"/>
+            <a:off x="471488" y="1916484"/>
+            <a:ext cx="5915025" cy="4567898"/>
           </a:xfrm>
           <a:prstGeom prst="rect">
             <a:avLst/>
@@ -2554,8 +2554,8 @@
         </p:nvSpPr>
         <p:spPr>
           <a:xfrm>
-            <a:off x="471488" y="7340703"/>
-            <a:ext cx="1543050" cy="421669"/>
+            <a:off x="471488" y="6672698"/>
+            <a:ext cx="1543050" cy="383297"/>
           </a:xfrm>
           <a:prstGeom prst="rect">
             <a:avLst/>
@@ -2577,7 +2577,7 @@
           <a:p>
             <a:fld id="{25CFA59A-171D-4C41-9418-ADAB2FBD5A82}" type="datetimeFigureOut">
               <a:rPr lang="en-US" smtClean="0"/>
-              <a:t>3/12/2019</a:t>
+              <a:t>5/22/2019</a:t>
             </a:fld>
             <a:endParaRPr lang="en-US"/>
           </a:p>
@@ -2595,8 +2595,8 @@
         </p:nvSpPr>
         <p:spPr>
           <a:xfrm>
-            <a:off x="2271713" y="7340703"/>
-            <a:ext cx="2314575" cy="421669"/>
+            <a:off x="2271713" y="6672698"/>
+            <a:ext cx="2314575" cy="383297"/>
           </a:xfrm>
           <a:prstGeom prst="rect">
             <a:avLst/>
@@ -2632,8 +2632,8 @@
         </p:nvSpPr>
         <p:spPr>
           <a:xfrm>
-            <a:off x="4843463" y="7340703"/>
-            <a:ext cx="1543050" cy="421669"/>
+            <a:off x="4843463" y="6672698"/>
+            <a:ext cx="1543050" cy="383297"/>
           </a:xfrm>
           <a:prstGeom prst="rect">
             <a:avLst/>
@@ -2664,23 +2664,23 @@
     </p:spTree>
     <p:extLst>
       <p:ext uri="{BB962C8B-B14F-4D97-AF65-F5344CB8AC3E}">
-        <p14:creationId xmlns:p14="http://schemas.microsoft.com/office/powerpoint/2010/main" val="2257852589"/>
+        <p14:creationId xmlns:p14="http://schemas.microsoft.com/office/powerpoint/2010/main" val="4073802047"/>
       </p:ext>
     </p:extLst>
   </p:cSld>
   <p:clrMap bg1="lt1" tx1="dk1" bg2="lt2" tx2="dk2" accent1="accent1" accent2="accent2" accent3="accent3" accent4="accent4" accent5="accent5" accent6="accent6" hlink="hlink" folHlink="folHlink"/>
   <p:sldLayoutIdLst>
-    <p:sldLayoutId id="2147483721" r:id="rId1"/>
-    <p:sldLayoutId id="2147483722" r:id="rId2"/>
-    <p:sldLayoutId id="2147483723" r:id="rId3"/>
-    <p:sldLayoutId id="2147483724" r:id="rId4"/>
-    <p:sldLayoutId id="2147483725" r:id="rId5"/>
-    <p:sldLayoutId id="2147483726" r:id="rId6"/>
-    <p:sldLayoutId id="2147483727" r:id="rId7"/>
-    <p:sldLayoutId id="2147483728" r:id="rId8"/>
-    <p:sldLayoutId id="2147483729" r:id="rId9"/>
-    <p:sldLayoutId id="2147483730" r:id="rId10"/>
-    <p:sldLayoutId id="2147483731" r:id="rId11"/>
+    <p:sldLayoutId id="2147483733" r:id="rId1"/>
+    <p:sldLayoutId id="2147483734" r:id="rId2"/>
+    <p:sldLayoutId id="2147483735" r:id="rId3"/>
+    <p:sldLayoutId id="2147483736" r:id="rId4"/>
+    <p:sldLayoutId id="2147483737" r:id="rId5"/>
+    <p:sldLayoutId id="2147483738" r:id="rId6"/>
+    <p:sldLayoutId id="2147483739" r:id="rId7"/>
+    <p:sldLayoutId id="2147483740" r:id="rId8"/>
+    <p:sldLayoutId id="2147483741" r:id="rId9"/>
+    <p:sldLayoutId id="2147483742" r:id="rId10"/>
+    <p:sldLayoutId id="2147483743" r:id="rId11"/>
   </p:sldLayoutIdLst>
   <p:txStyles>
     <p:titleStyle>
@@ -2990,7 +2990,7 @@
         </p:nvSpPr>
         <p:spPr>
           <a:xfrm>
-            <a:off x="407128" y="236370"/>
+            <a:off x="407129" y="392055"/>
             <a:ext cx="1785257" cy="923330"/>
           </a:xfrm>
           <a:prstGeom prst="rect">
@@ -3040,7 +3040,7 @@
         </p:nvCxnSpPr>
         <p:spPr>
           <a:xfrm>
-            <a:off x="1299753" y="1159704"/>
+            <a:off x="1299753" y="1315390"/>
             <a:ext cx="0" cy="446827"/>
           </a:xfrm>
           <a:prstGeom prst="straightConnector1">
@@ -3076,7 +3076,7 @@
         </p:nvSpPr>
         <p:spPr>
           <a:xfrm>
-            <a:off x="407128" y="1606531"/>
+            <a:off x="407129" y="1762217"/>
             <a:ext cx="1785257" cy="646331"/>
           </a:xfrm>
           <a:prstGeom prst="rect">
@@ -3110,7 +3110,7 @@
         </p:nvSpPr>
         <p:spPr>
           <a:xfrm>
-            <a:off x="2429694" y="1214644"/>
+            <a:off x="2429694" y="1370329"/>
             <a:ext cx="3709850" cy="369332"/>
           </a:xfrm>
           <a:prstGeom prst="rect">
@@ -3146,7 +3146,7 @@
         </p:nvCxnSpPr>
         <p:spPr>
           <a:xfrm>
-            <a:off x="1299750" y="1397634"/>
+            <a:off x="1299750" y="1553319"/>
             <a:ext cx="1129944" cy="1676"/>
           </a:xfrm>
           <a:prstGeom prst="straightConnector1">
@@ -3184,7 +3184,7 @@
         </p:nvCxnSpPr>
         <p:spPr>
           <a:xfrm>
-            <a:off x="1299751" y="2252855"/>
+            <a:off x="1299751" y="2408540"/>
             <a:ext cx="2" cy="417792"/>
           </a:xfrm>
           <a:prstGeom prst="straightConnector1">
@@ -3220,7 +3220,7 @@
         </p:nvSpPr>
         <p:spPr>
           <a:xfrm>
-            <a:off x="407128" y="2670651"/>
+            <a:off x="407129" y="2826337"/>
             <a:ext cx="1785257" cy="646331"/>
           </a:xfrm>
           <a:prstGeom prst="rect">
@@ -3254,7 +3254,7 @@
         </p:nvSpPr>
         <p:spPr>
           <a:xfrm>
-            <a:off x="2429694" y="2130726"/>
+            <a:off x="2429694" y="2286412"/>
             <a:ext cx="3709850" cy="646331"/>
           </a:xfrm>
           <a:prstGeom prst="rect">
@@ -3290,7 +3290,7 @@
         </p:nvCxnSpPr>
         <p:spPr>
           <a:xfrm flipV="1">
-            <a:off x="1299750" y="2453892"/>
+            <a:off x="1299750" y="2609578"/>
             <a:ext cx="1129944" cy="7867"/>
           </a:xfrm>
           <a:prstGeom prst="straightConnector1">
@@ -3328,7 +3328,7 @@
         </p:nvCxnSpPr>
         <p:spPr>
           <a:xfrm>
-            <a:off x="1299751" y="4664906"/>
+            <a:off x="1299751" y="4820592"/>
             <a:ext cx="2" cy="417789"/>
           </a:xfrm>
           <a:prstGeom prst="straightConnector1">
@@ -3364,7 +3364,7 @@
         </p:nvSpPr>
         <p:spPr>
           <a:xfrm>
-            <a:off x="407128" y="5082691"/>
+            <a:off x="407129" y="5238376"/>
             <a:ext cx="1785257" cy="923330"/>
           </a:xfrm>
           <a:prstGeom prst="rect">
@@ -3391,8 +3391,17 @@
           <a:p>
             <a:r>
               <a:rPr lang="en-US" dirty="0"/>
-              <a:t>(N = 49,427)</a:t>
-            </a:r>
+              <a:t>(N = </a:t>
+            </a:r>
+            <a:r>
+              <a:rPr lang="en-US" dirty="0" smtClean="0"/>
+              <a:t>49,235</a:t>
+            </a:r>
+            <a:r>
+              <a:rPr lang="en-US" dirty="0"/>
+              <a:t>)</a:t>
+            </a:r>
+            <a:endParaRPr lang="en-US" dirty="0"/>
           </a:p>
         </p:txBody>
       </p:sp>
@@ -3404,8 +3413,8 @@
         </p:nvSpPr>
         <p:spPr>
           <a:xfrm>
-            <a:off x="2429701" y="4412138"/>
-            <a:ext cx="3709851" cy="3139321"/>
+            <a:off x="2429702" y="4567823"/>
+            <a:ext cx="3709851" cy="2308324"/>
           </a:xfrm>
           <a:prstGeom prst="rect">
             <a:avLst/>
@@ -3445,7 +3454,7 @@
             </a:pPr>
             <a:r>
               <a:rPr lang="en-US" dirty="0"/>
-              <a:t>Resurfacings (N = 0)</a:t>
+              <a:t>BMI &gt; 50 or missing (N = 2957)</a:t>
             </a:r>
           </a:p>
           <a:p>
@@ -3454,9 +3463,22 @@
               <a:buChar char="•"/>
             </a:pPr>
             <a:r>
+              <a:rPr lang="en-US" dirty="0" smtClean="0"/>
+              <a:t>ASA = 4, 5 or missing  </a:t>
+            </a:r>
+            <a:r>
               <a:rPr lang="en-US" dirty="0"/>
-              <a:t>Age &lt;18 or &gt; 100 (N = 0)</a:t>
-            </a:r>
+              <a:t>(N = </a:t>
+            </a:r>
+            <a:r>
+              <a:rPr lang="en-US" dirty="0" smtClean="0"/>
+              <a:t>805</a:t>
+            </a:r>
+            <a:r>
+              <a:rPr lang="en-US" dirty="0" smtClean="0"/>
+              <a:t>)</a:t>
+            </a:r>
+            <a:endParaRPr lang="en-US" dirty="0"/>
           </a:p>
           <a:p>
             <a:pPr marL="285772" indent="-285772">
@@ -3465,37 +3487,7 @@
             </a:pPr>
             <a:r>
               <a:rPr lang="en-US" dirty="0"/>
-              <a:t>BMI &gt; 50 or missing (N = 2957)</a:t>
-            </a:r>
-          </a:p>
-          <a:p>
-            <a:pPr marL="285772" indent="-285772">
-              <a:buFont typeface="Arial" panose="020B0604020202020204" pitchFamily="34" charset="0"/>
-              <a:buChar char="•"/>
-            </a:pPr>
-            <a:r>
-              <a:rPr lang="en-US" dirty="0"/>
-              <a:t>Missing ASA (N = 609)</a:t>
-            </a:r>
-          </a:p>
-          <a:p>
-            <a:pPr marL="285772" indent="-285772">
-              <a:buFont typeface="Arial" panose="020B0604020202020204" pitchFamily="34" charset="0"/>
-              <a:buChar char="•"/>
-            </a:pPr>
-            <a:r>
-              <a:rPr lang="en-US" dirty="0"/>
               <a:t>Missing education (N = 348)</a:t>
-            </a:r>
-          </a:p>
-          <a:p>
-            <a:pPr marL="285772" indent="-285772">
-              <a:buFont typeface="Arial" panose="020B0604020202020204" pitchFamily="34" charset="0"/>
-              <a:buChar char="•"/>
-            </a:pPr>
-            <a:r>
-              <a:rPr lang="en-US" dirty="0"/>
-              <a:t>Missing civil status (N = 0)</a:t>
             </a:r>
           </a:p>
           <a:p>
@@ -3518,7 +3510,7 @@
         </p:nvCxnSpPr>
         <p:spPr>
           <a:xfrm flipV="1">
-            <a:off x="1299757" y="4857001"/>
+            <a:off x="1299758" y="5012687"/>
             <a:ext cx="1129943" cy="16803"/>
           </a:xfrm>
           <a:prstGeom prst="straightConnector1">
@@ -3556,7 +3548,7 @@
         </p:nvCxnSpPr>
         <p:spPr>
           <a:xfrm>
-            <a:off x="1299752" y="3334181"/>
+            <a:off x="1299753" y="3489867"/>
             <a:ext cx="5" cy="417795"/>
           </a:xfrm>
           <a:prstGeom prst="straightConnector1">
@@ -3592,7 +3584,7 @@
         </p:nvSpPr>
         <p:spPr>
           <a:xfrm>
-            <a:off x="407128" y="3751975"/>
+            <a:off x="407129" y="3907660"/>
             <a:ext cx="1785257" cy="923330"/>
           </a:xfrm>
           <a:prstGeom prst="rect">
@@ -3632,7 +3624,7 @@
         </p:nvSpPr>
         <p:spPr>
           <a:xfrm>
-            <a:off x="2429694" y="3212051"/>
+            <a:off x="2429694" y="3367737"/>
             <a:ext cx="3709850" cy="646331"/>
           </a:xfrm>
           <a:prstGeom prst="rect">
@@ -3652,16 +3644,19 @@
           <a:lstStyle/>
           <a:p>
             <a:r>
-              <a:rPr lang="en-US" dirty="0" smtClean="0"/>
-              <a:t>Cemented/hybrid/reverse hybrid </a:t>
-            </a:r>
-          </a:p>
-          <a:p>
-            <a:r>
-              <a:rPr lang="en-US" dirty="0" smtClean="0"/>
+              <a:rPr lang="en-US" dirty="0" err="1"/>
+              <a:t>Uncemented</a:t>
+            </a:r>
+            <a:r>
+              <a:rPr lang="en-US" dirty="0"/>
+              <a:t>/hybrid/reverse hybrid </a:t>
+            </a:r>
+          </a:p>
+          <a:p>
+            <a:r>
+              <a:rPr lang="en-US" dirty="0"/>
               <a:t>(N = 26,170)</a:t>
             </a:r>
-            <a:endParaRPr lang="en-US" dirty="0"/>
           </a:p>
         </p:txBody>
       </p:sp>
@@ -3675,7 +3670,7 @@
         </p:nvCxnSpPr>
         <p:spPr>
           <a:xfrm flipV="1">
-            <a:off x="1299750" y="3535217"/>
+            <a:off x="1299750" y="3690903"/>
             <a:ext cx="1129944" cy="7867"/>
           </a:xfrm>
           <a:prstGeom prst="straightConnector1">

</xml_diff>

<commit_message>
Use BRLasso with some preliminary result to present to SN and OR.
</commit_message>
<xml_diff>
--- a/graphs/fig1.pptx
+++ b/graphs/fig1.pptx
@@ -254,7 +254,7 @@
           <a:p>
             <a:fld id="{25CFA59A-171D-4C41-9418-ADAB2FBD5A82}" type="datetimeFigureOut">
               <a:rPr lang="en-US" smtClean="0"/>
-              <a:t>5/22/2019</a:t>
+              <a:t>6/19/2019</a:t>
             </a:fld>
             <a:endParaRPr lang="en-US"/>
           </a:p>
@@ -424,7 +424,7 @@
           <a:p>
             <a:fld id="{25CFA59A-171D-4C41-9418-ADAB2FBD5A82}" type="datetimeFigureOut">
               <a:rPr lang="en-US" smtClean="0"/>
-              <a:t>5/22/2019</a:t>
+              <a:t>6/19/2019</a:t>
             </a:fld>
             <a:endParaRPr lang="en-US"/>
           </a:p>
@@ -604,7 +604,7 @@
           <a:p>
             <a:fld id="{25CFA59A-171D-4C41-9418-ADAB2FBD5A82}" type="datetimeFigureOut">
               <a:rPr lang="en-US" smtClean="0"/>
-              <a:t>5/22/2019</a:t>
+              <a:t>6/19/2019</a:t>
             </a:fld>
             <a:endParaRPr lang="en-US"/>
           </a:p>
@@ -774,7 +774,7 @@
           <a:p>
             <a:fld id="{25CFA59A-171D-4C41-9418-ADAB2FBD5A82}" type="datetimeFigureOut">
               <a:rPr lang="en-US" smtClean="0"/>
-              <a:t>5/22/2019</a:t>
+              <a:t>6/19/2019</a:t>
             </a:fld>
             <a:endParaRPr lang="en-US"/>
           </a:p>
@@ -1018,7 +1018,7 @@
           <a:p>
             <a:fld id="{25CFA59A-171D-4C41-9418-ADAB2FBD5A82}" type="datetimeFigureOut">
               <a:rPr lang="en-US" smtClean="0"/>
-              <a:t>5/22/2019</a:t>
+              <a:t>6/19/2019</a:t>
             </a:fld>
             <a:endParaRPr lang="en-US"/>
           </a:p>
@@ -1250,7 +1250,7 @@
           <a:p>
             <a:fld id="{25CFA59A-171D-4C41-9418-ADAB2FBD5A82}" type="datetimeFigureOut">
               <a:rPr lang="en-US" smtClean="0"/>
-              <a:t>5/22/2019</a:t>
+              <a:t>6/19/2019</a:t>
             </a:fld>
             <a:endParaRPr lang="en-US"/>
           </a:p>
@@ -1617,7 +1617,7 @@
           <a:p>
             <a:fld id="{25CFA59A-171D-4C41-9418-ADAB2FBD5A82}" type="datetimeFigureOut">
               <a:rPr lang="en-US" smtClean="0"/>
-              <a:t>5/22/2019</a:t>
+              <a:t>6/19/2019</a:t>
             </a:fld>
             <a:endParaRPr lang="en-US"/>
           </a:p>
@@ -1735,7 +1735,7 @@
           <a:p>
             <a:fld id="{25CFA59A-171D-4C41-9418-ADAB2FBD5A82}" type="datetimeFigureOut">
               <a:rPr lang="en-US" smtClean="0"/>
-              <a:t>5/22/2019</a:t>
+              <a:t>6/19/2019</a:t>
             </a:fld>
             <a:endParaRPr lang="en-US"/>
           </a:p>
@@ -1830,7 +1830,7 @@
           <a:p>
             <a:fld id="{25CFA59A-171D-4C41-9418-ADAB2FBD5A82}" type="datetimeFigureOut">
               <a:rPr lang="en-US" smtClean="0"/>
-              <a:t>5/22/2019</a:t>
+              <a:t>6/19/2019</a:t>
             </a:fld>
             <a:endParaRPr lang="en-US"/>
           </a:p>
@@ -2107,7 +2107,7 @@
           <a:p>
             <a:fld id="{25CFA59A-171D-4C41-9418-ADAB2FBD5A82}" type="datetimeFigureOut">
               <a:rPr lang="en-US" smtClean="0"/>
-              <a:t>5/22/2019</a:t>
+              <a:t>6/19/2019</a:t>
             </a:fld>
             <a:endParaRPr lang="en-US"/>
           </a:p>
@@ -2364,7 +2364,7 @@
           <a:p>
             <a:fld id="{25CFA59A-171D-4C41-9418-ADAB2FBD5A82}" type="datetimeFigureOut">
               <a:rPr lang="en-US" smtClean="0"/>
-              <a:t>5/22/2019</a:t>
+              <a:t>6/19/2019</a:t>
             </a:fld>
             <a:endParaRPr lang="en-US"/>
           </a:p>
@@ -2577,7 +2577,7 @@
           <a:p>
             <a:fld id="{25CFA59A-171D-4C41-9418-ADAB2FBD5A82}" type="datetimeFigureOut">
               <a:rPr lang="en-US" smtClean="0"/>
-              <a:t>5/22/2019</a:t>
+              <a:t>6/19/2019</a:t>
             </a:fld>
             <a:endParaRPr lang="en-US"/>
           </a:p>
@@ -3111,7 +3111,7 @@
         <p:spPr>
           <a:xfrm>
             <a:off x="2429694" y="1370329"/>
-            <a:ext cx="3709850" cy="369332"/>
+            <a:ext cx="4306084" cy="369332"/>
           </a:xfrm>
           <a:prstGeom prst="rect">
             <a:avLst/>
@@ -3131,7 +3131,15 @@
           <a:p>
             <a:r>
               <a:rPr lang="en-US" dirty="0"/>
-              <a:t>Other diagnosis than OA (N = 24,973)</a:t>
+              <a:t>Other diagnosis than OA </a:t>
+            </a:r>
+            <a:r>
+              <a:rPr lang="en-US" dirty="0" smtClean="0"/>
+              <a:t>	(</a:t>
+            </a:r>
+            <a:r>
+              <a:rPr lang="en-US" dirty="0"/>
+              <a:t>N = 24,973)</a:t>
             </a:r>
           </a:p>
         </p:txBody>
@@ -3241,8 +3249,17 @@
           <a:p>
             <a:r>
               <a:rPr lang="en-US" dirty="0"/>
-              <a:t>Patients with OA  (N = 80,805)</a:t>
-            </a:r>
+              <a:t>Patients with OA  (N = </a:t>
+            </a:r>
+            <a:r>
+              <a:rPr lang="en-US" dirty="0" smtClean="0"/>
+              <a:t>76,158</a:t>
+            </a:r>
+            <a:r>
+              <a:rPr lang="en-US" dirty="0"/>
+              <a:t>)</a:t>
+            </a:r>
+            <a:endParaRPr lang="en-US" dirty="0"/>
           </a:p>
         </p:txBody>
       </p:sp>
@@ -3254,8 +3271,8 @@
         </p:nvSpPr>
         <p:spPr>
           <a:xfrm>
-            <a:off x="2429694" y="2286412"/>
-            <a:ext cx="3709850" cy="646331"/>
+            <a:off x="2429694" y="1942377"/>
+            <a:ext cx="4306084" cy="1200329"/>
           </a:xfrm>
           <a:prstGeom prst="rect">
             <a:avLst/>
@@ -3274,9 +3291,45 @@
           <a:lstStyle/>
           <a:p>
             <a:r>
+              <a:rPr lang="en-US" dirty="0" smtClean="0"/>
+              <a:t>Exclusion of 				(N = 26,540):</a:t>
+            </a:r>
+          </a:p>
+          <a:p>
+            <a:pPr marL="285750" indent="-285750">
+              <a:buFont typeface="Arial" panose="020B0604020202020204" pitchFamily="34" charset="0"/>
+              <a:buChar char="•"/>
+            </a:pPr>
+            <a:r>
+              <a:rPr lang="en-US" dirty="0" smtClean="0"/>
+              <a:t>2nd bilateral hip 		(N = 25,623)</a:t>
+            </a:r>
+          </a:p>
+          <a:p>
+            <a:pPr marL="285750" indent="-285750">
+              <a:buFont typeface="Arial" panose="020B0604020202020204" pitchFamily="34" charset="0"/>
+              <a:buChar char="•"/>
+            </a:pPr>
+            <a:r>
+              <a:rPr lang="en-US" dirty="0" smtClean="0"/>
+              <a:t>1st bilateral if 2nd </a:t>
+            </a:r>
+            <a:br>
+              <a:rPr lang="en-US" dirty="0" smtClean="0"/>
+            </a:br>
+            <a:r>
+              <a:rPr lang="en-US" dirty="0" smtClean="0"/>
+              <a:t>within 90 days 		</a:t>
+            </a:r>
+            <a:r>
               <a:rPr lang="en-US" dirty="0"/>
-              <a:t>Second procedure in bilaterally operated patients (N = 21,893)</a:t>
-            </a:r>
+              <a:t>	</a:t>
+            </a:r>
+            <a:r>
+              <a:rPr lang="en-US" dirty="0" smtClean="0"/>
+              <a:t>(N = 917)</a:t>
+            </a:r>
+            <a:endParaRPr lang="en-US" dirty="0"/>
           </a:p>
         </p:txBody>
       </p:sp>
@@ -3290,8 +3343,8 @@
         </p:nvCxnSpPr>
         <p:spPr>
           <a:xfrm flipV="1">
-            <a:off x="1299750" y="2609578"/>
-            <a:ext cx="1129944" cy="7867"/>
+            <a:off x="1299750" y="2542542"/>
+            <a:ext cx="1129944" cy="1482"/>
           </a:xfrm>
           <a:prstGeom prst="straightConnector1">
             <a:avLst/>
@@ -3395,7 +3448,7 @@
             </a:r>
             <a:r>
               <a:rPr lang="en-US" dirty="0" smtClean="0"/>
-              <a:t>49,235</a:t>
+              <a:t>46,272</a:t>
             </a:r>
             <a:r>
               <a:rPr lang="en-US" dirty="0"/>
@@ -3414,7 +3467,7 @@
         <p:spPr>
           <a:xfrm>
             <a:off x="2429702" y="4567823"/>
-            <a:ext cx="3709851" cy="2308324"/>
+            <a:ext cx="4306076" cy="1477328"/>
           </a:xfrm>
           <a:prstGeom prst="rect">
             <a:avLst/>
@@ -3434,8 +3487,25 @@
           <a:p>
             <a:r>
               <a:rPr lang="en-US" dirty="0"/>
-              <a:t>Exclusion of (N = 4,291):</a:t>
-            </a:r>
+              <a:t>Exclusion of </a:t>
+            </a:r>
+            <a:r>
+              <a:rPr lang="en-US" dirty="0" smtClean="0"/>
+              <a:t>				(</a:t>
+            </a:r>
+            <a:r>
+              <a:rPr lang="en-US" dirty="0"/>
+              <a:t>N </a:t>
+            </a:r>
+            <a:r>
+              <a:rPr lang="en-US"/>
+              <a:t>= </a:t>
+            </a:r>
+            <a:r>
+              <a:rPr lang="en-US" smtClean="0"/>
+              <a:t>4,297):</a:t>
+            </a:r>
+            <a:endParaRPr lang="en-US" dirty="0"/>
           </a:p>
           <a:p>
             <a:pPr marL="285772" indent="-285772">
@@ -3443,9 +3513,26 @@
               <a:buChar char="•"/>
             </a:pPr>
             <a:r>
+              <a:rPr lang="en-US" dirty="0" smtClean="0"/>
+              <a:t>BMI </a:t>
+            </a:r>
+            <a:r>
               <a:rPr lang="en-US" dirty="0"/>
-              <a:t>Bilaterally operated patients with second procedure within 90 days after first THA  (N = 917)</a:t>
-            </a:r>
+              <a:t>&gt; 50 or missing </a:t>
+            </a:r>
+            <a:r>
+              <a:rPr lang="en-US" dirty="0" smtClean="0"/>
+              <a:t>		(</a:t>
+            </a:r>
+            <a:r>
+              <a:rPr lang="en-US" dirty="0"/>
+              <a:t>N = </a:t>
+            </a:r>
+            <a:r>
+              <a:rPr lang="en-US" dirty="0" smtClean="0"/>
+              <a:t>2,860)</a:t>
+            </a:r>
+            <a:endParaRPr lang="en-US" dirty="0"/>
           </a:p>
           <a:p>
             <a:pPr marL="285772" indent="-285772">
@@ -3453,9 +3540,22 @@
               <a:buChar char="•"/>
             </a:pPr>
             <a:r>
+              <a:rPr lang="en-US" dirty="0" smtClean="0"/>
+              <a:t>ASA = 4, 5 or missing  </a:t>
+            </a:r>
+            <a:r>
+              <a:rPr lang="en-US" dirty="0" smtClean="0"/>
+              <a:t>	(</a:t>
+            </a:r>
+            <a:r>
               <a:rPr lang="en-US" dirty="0"/>
-              <a:t>BMI &gt; 50 or missing (N = 2957)</a:t>
-            </a:r>
+              <a:t>N = </a:t>
+            </a:r>
+            <a:r>
+              <a:rPr lang="en-US" dirty="0" smtClean="0"/>
+              <a:t>749)</a:t>
+            </a:r>
+            <a:endParaRPr lang="en-US" dirty="0"/>
           </a:p>
           <a:p>
             <a:pPr marL="285772" indent="-285772">
@@ -3463,20 +3563,20 @@
               <a:buChar char="•"/>
             </a:pPr>
             <a:r>
+              <a:rPr lang="en-US" dirty="0"/>
+              <a:t>Missing education </a:t>
+            </a:r>
+            <a:r>
               <a:rPr lang="en-US" dirty="0" smtClean="0"/>
-              <a:t>ASA = 4, 5 or missing  </a:t>
+              <a:t>		(</a:t>
             </a:r>
             <a:r>
               <a:rPr lang="en-US" dirty="0"/>
-              <a:t>(N = </a:t>
+              <a:t>N = </a:t>
             </a:r>
             <a:r>
               <a:rPr lang="en-US" dirty="0" smtClean="0"/>
-              <a:t>805</a:t>
-            </a:r>
-            <a:r>
-              <a:rPr lang="en-US" dirty="0" smtClean="0"/>
-              <a:t>)</a:t>
+              <a:t>339)</a:t>
             </a:r>
             <a:endParaRPr lang="en-US" dirty="0"/>
           </a:p>
@@ -3487,18 +3587,21 @@
             </a:pPr>
             <a:r>
               <a:rPr lang="en-US" dirty="0"/>
-              <a:t>Missing education (N = 348)</a:t>
-            </a:r>
-          </a:p>
-          <a:p>
-            <a:pPr marL="285772" indent="-285772">
-              <a:buFont typeface="Arial" panose="020B0604020202020204" pitchFamily="34" charset="0"/>
-              <a:buChar char="•"/>
-            </a:pPr>
+              <a:t>Missing type of hospital </a:t>
+            </a:r>
+            <a:r>
+              <a:rPr lang="en-US" dirty="0" smtClean="0"/>
+              <a:t>	(</a:t>
+            </a:r>
             <a:r>
               <a:rPr lang="en-US" dirty="0"/>
-              <a:t>Missing type of hospital (N = 377) </a:t>
-            </a:r>
+              <a:t>N = </a:t>
+            </a:r>
+            <a:r>
+              <a:rPr lang="en-US" dirty="0" smtClean="0"/>
+              <a:t>349) </a:t>
+            </a:r>
+            <a:endParaRPr lang="en-US" dirty="0"/>
           </a:p>
         </p:txBody>
       </p:sp>
@@ -3611,8 +3714,17 @@
           <a:p>
             <a:r>
               <a:rPr lang="en-US" dirty="0"/>
-              <a:t>(N = 53,718)</a:t>
-            </a:r>
+              <a:t>(N = </a:t>
+            </a:r>
+            <a:r>
+              <a:rPr lang="en-US" dirty="0" smtClean="0"/>
+              <a:t>50,569</a:t>
+            </a:r>
+            <a:r>
+              <a:rPr lang="en-US" dirty="0"/>
+              <a:t>)</a:t>
+            </a:r>
+            <a:endParaRPr lang="en-US" dirty="0"/>
           </a:p>
         </p:txBody>
       </p:sp>
@@ -3624,8 +3736,8 @@
         </p:nvSpPr>
         <p:spPr>
           <a:xfrm>
-            <a:off x="2429694" y="3367737"/>
-            <a:ext cx="3709850" cy="646331"/>
+            <a:off x="2429693" y="3367737"/>
+            <a:ext cx="4306085" cy="646331"/>
           </a:xfrm>
           <a:prstGeom prst="rect">
             <a:avLst/>
@@ -3649,14 +3761,36 @@
             </a:r>
             <a:r>
               <a:rPr lang="en-US" dirty="0"/>
-              <a:t>/hybrid/reverse hybrid </a:t>
-            </a:r>
-          </a:p>
-          <a:p>
+              <a:t>/hybrid</a:t>
+            </a:r>
+            <a:r>
+              <a:rPr lang="en-US" dirty="0" smtClean="0"/>
+              <a:t>/</a:t>
+            </a:r>
+            <a:br>
+              <a:rPr lang="en-US" dirty="0" smtClean="0"/>
+            </a:br>
+            <a:r>
+              <a:rPr lang="en-US" dirty="0" smtClean="0"/>
+              <a:t>reverse </a:t>
+            </a:r>
             <a:r>
               <a:rPr lang="en-US" dirty="0"/>
-              <a:t>(N = 26,170)</a:t>
-            </a:r>
+              <a:t>hybrid </a:t>
+            </a:r>
+            <a:r>
+              <a:rPr lang="en-US" dirty="0" smtClean="0"/>
+              <a:t>			(</a:t>
+            </a:r>
+            <a:r>
+              <a:rPr lang="en-US" dirty="0"/>
+              <a:t>N = </a:t>
+            </a:r>
+            <a:r>
+              <a:rPr lang="en-US" dirty="0" smtClean="0"/>
+              <a:t>25,589)</a:t>
+            </a:r>
+            <a:endParaRPr lang="en-US" dirty="0"/>
           </a:p>
         </p:txBody>
       </p:sp>
@@ -3671,7 +3805,7 @@
         <p:spPr>
           <a:xfrm flipV="1">
             <a:off x="1299750" y="3690903"/>
-            <a:ext cx="1129944" cy="7867"/>
+            <a:ext cx="1129943" cy="7868"/>
           </a:xfrm>
           <a:prstGeom prst="straightConnector1">
             <a:avLst/>

</xml_diff>